<commit_message>
updating google slides blueprint
</commit_message>
<xml_diff>
--- a/Dashboard Blueprint.pptx
+++ b/Dashboard Blueprint.pptx
@@ -12,6 +12,7 @@
     <p:sldId id="257" r:id="rId7"/>
     <p:sldId id="258" r:id="rId8"/>
     <p:sldId id="259" r:id="rId9"/>
+    <p:sldId id="260" r:id="rId10"/>
   </p:sldIdLst>
   <p:sldSz cy="5143500" cx="9144000"/>
   <p:notesSz cx="6858000" cy="9144000"/>
@@ -807,7 +808,7 @@
       </p:grpSpPr>
       <p:sp>
         <p:nvSpPr>
-          <p:cNvPr id="57" name="Google Shape;57;g1421e8b540f_0_13:notes"/>
+          <p:cNvPr id="57" name="Google Shape;57;g147ac658b10_0_0:notes"/>
           <p:cNvSpPr/>
           <p:nvPr>
             <p:ph idx="2" type="sldImg"/>
@@ -842,7 +843,7 @@
       </p:sp>
       <p:sp>
         <p:nvSpPr>
-          <p:cNvPr id="58" name="Google Shape;58;g1421e8b540f_0_13:notes"/>
+          <p:cNvPr id="58" name="Google Shape;58;g147ac658b10_0_0:notes"/>
           <p:cNvSpPr txBox="1"/>
           <p:nvPr>
             <p:ph idx="1" type="body"/>
@@ -892,7 +893,7 @@
   <p:cSld>
     <p:spTree>
       <p:nvGrpSpPr>
-        <p:cNvPr id="62" name="Shape 62"/>
+        <p:cNvPr id="61" name="Shape 61"/>
         <p:cNvGrpSpPr/>
         <p:nvPr/>
       </p:nvGrpSpPr>
@@ -906,7 +907,7 @@
       </p:grpSpPr>
       <p:sp>
         <p:nvSpPr>
-          <p:cNvPr id="63" name="Google Shape;63;g1421e8b540f_0_5:notes"/>
+          <p:cNvPr id="62" name="Google Shape;62;g1421e8b540f_0_13:notes"/>
           <p:cNvSpPr/>
           <p:nvPr>
             <p:ph idx="2" type="sldImg"/>
@@ -941,7 +942,7 @@
       </p:sp>
       <p:sp>
         <p:nvSpPr>
-          <p:cNvPr id="64" name="Google Shape;64;g1421e8b540f_0_5:notes"/>
+          <p:cNvPr id="63" name="Google Shape;63;g1421e8b540f_0_13:notes"/>
           <p:cNvSpPr txBox="1"/>
           <p:nvPr>
             <p:ph idx="1" type="body"/>
@@ -991,7 +992,7 @@
   <p:cSld>
     <p:spTree>
       <p:nvGrpSpPr>
-        <p:cNvPr id="68" name="Shape 68"/>
+        <p:cNvPr id="67" name="Shape 67"/>
         <p:cNvGrpSpPr/>
         <p:nvPr/>
       </p:nvGrpSpPr>
@@ -1005,7 +1006,7 @@
       </p:grpSpPr>
       <p:sp>
         <p:nvSpPr>
-          <p:cNvPr id="69" name="Google Shape;69;g1421e8b540f_0_18:notes"/>
+          <p:cNvPr id="68" name="Google Shape;68;g1421e8b540f_0_5:notes"/>
           <p:cNvSpPr/>
           <p:nvPr>
             <p:ph idx="2" type="sldImg"/>
@@ -1040,7 +1041,106 @@
       </p:sp>
       <p:sp>
         <p:nvSpPr>
-          <p:cNvPr id="70" name="Google Shape;70;g1421e8b540f_0_18:notes"/>
+          <p:cNvPr id="69" name="Google Shape;69;g1421e8b540f_0_5:notes"/>
+          <p:cNvSpPr txBox="1"/>
+          <p:nvPr>
+            <p:ph idx="1" type="body"/>
+          </p:nvPr>
+        </p:nvSpPr>
+        <p:spPr>
+          <a:xfrm>
+            <a:off x="685800" y="4343400"/>
+            <a:ext cx="5486400" cy="4114800"/>
+          </a:xfrm>
+          <a:prstGeom prst="rect">
+            <a:avLst/>
+          </a:prstGeom>
+        </p:spPr>
+        <p:txBody>
+          <a:bodyPr anchorCtr="0" anchor="t" bIns="91425" lIns="91425" spcFirstLastPara="1" rIns="91425" wrap="square" tIns="91425">
+            <a:noAutofit/>
+          </a:bodyPr>
+          <a:lstStyle/>
+          <a:p>
+            <a:pPr indent="0" lvl="0" marL="0" rtl="0" algn="l">
+              <a:spcBef>
+                <a:spcPts val="0"/>
+              </a:spcBef>
+              <a:spcAft>
+                <a:spcPts val="0"/>
+              </a:spcAft>
+              <a:buNone/>
+            </a:pPr>
+            <a:r>
+              <a:t/>
+            </a:r>
+            <a:endParaRPr/>
+          </a:p>
+        </p:txBody>
+      </p:sp>
+    </p:spTree>
+  </p:cSld>
+  <p:clrMapOvr>
+    <a:masterClrMapping/>
+  </p:clrMapOvr>
+</p:notes>
+</file>
+
+<file path=ppt/notesSlides/notesSlide5.xml><?xml version="1.0" encoding="utf-8"?>
+<p:notes xmlns:a="http://schemas.openxmlformats.org/drawingml/2006/main" xmlns:r="http://schemas.openxmlformats.org/officeDocument/2006/relationships" xmlns:mc="http://schemas.openxmlformats.org/markup-compatibility/2006" xmlns:mv="urn:schemas-microsoft-com:mac:vml" xmlns:p="http://schemas.openxmlformats.org/presentationml/2006/main" xmlns:c="http://schemas.openxmlformats.org/drawingml/2006/chart" xmlns:dgm="http://schemas.openxmlformats.org/drawingml/2006/diagram" xmlns:o="urn:schemas-microsoft-com:office:office" xmlns:v="urn:schemas-microsoft-com:vml" xmlns:pvml="urn:schemas-microsoft-com:office:powerpoint" xmlns:com="http://schemas.openxmlformats.org/drawingml/2006/compatibility" xmlns:p14="http://schemas.microsoft.com/office/powerpoint/2010/main" xmlns:p15="http://schemas.microsoft.com/office/powerpoint/2012/main" xmlns:ahyp="http://schemas.microsoft.com/office/drawing/2018/hyperlinkcolor" showMasterPhAnim="0" showMasterSp="0">
+  <p:cSld>
+    <p:spTree>
+      <p:nvGrpSpPr>
+        <p:cNvPr id="73" name="Shape 73"/>
+        <p:cNvGrpSpPr/>
+        <p:nvPr/>
+      </p:nvGrpSpPr>
+      <p:grpSpPr>
+        <a:xfrm>
+          <a:off x="0" y="0"/>
+          <a:ext cx="0" cy="0"/>
+          <a:chOff x="0" y="0"/>
+          <a:chExt cx="0" cy="0"/>
+        </a:xfrm>
+      </p:grpSpPr>
+      <p:sp>
+        <p:nvSpPr>
+          <p:cNvPr id="74" name="Google Shape;74;g1421e8b540f_0_18:notes"/>
+          <p:cNvSpPr/>
+          <p:nvPr>
+            <p:ph idx="2" type="sldImg"/>
+          </p:nvPr>
+        </p:nvSpPr>
+        <p:spPr>
+          <a:xfrm>
+            <a:off x="381300" y="685800"/>
+            <a:ext cx="6096000" cy="3429000"/>
+          </a:xfrm>
+          <a:custGeom>
+            <a:rect b="b" l="l" r="r" t="t"/>
+            <a:pathLst>
+              <a:path extrusionOk="0" h="120000" w="120000">
+                <a:moveTo>
+                  <a:pt x="0" y="0"/>
+                </a:moveTo>
+                <a:lnTo>
+                  <a:pt x="120000" y="0"/>
+                </a:lnTo>
+                <a:lnTo>
+                  <a:pt x="120000" y="120000"/>
+                </a:lnTo>
+                <a:lnTo>
+                  <a:pt x="0" y="120000"/>
+                </a:lnTo>
+                <a:close/>
+              </a:path>
+            </a:pathLst>
+          </a:custGeom>
+        </p:spPr>
+      </p:sp>
+      <p:sp>
+        <p:nvSpPr>
+          <p:cNvPr id="75" name="Google Shape;75;g1421e8b540f_0_18:notes"/>
           <p:cNvSpPr txBox="1"/>
           <p:nvPr>
             <p:ph idx="1" type="body"/>
@@ -5861,6 +5961,71 @@
           <p:cNvPr id="60" name="Google Shape;60;p14"/>
           <p:cNvSpPr txBox="1"/>
           <p:nvPr>
+            <p:ph type="ctrTitle"/>
+          </p:nvPr>
+        </p:nvSpPr>
+        <p:spPr>
+          <a:xfrm>
+            <a:off x="311708" y="744575"/>
+            <a:ext cx="8520600" cy="2052600"/>
+          </a:xfrm>
+          <a:prstGeom prst="rect">
+            <a:avLst/>
+          </a:prstGeom>
+        </p:spPr>
+        <p:txBody>
+          <a:bodyPr anchorCtr="0" anchor="b" bIns="91425" lIns="91425" spcFirstLastPara="1" rIns="91425" wrap="square" tIns="91425">
+            <a:normAutofit/>
+          </a:bodyPr>
+          <a:lstStyle/>
+          <a:p>
+            <a:pPr indent="0" lvl="0" marL="0" rtl="0" algn="ctr">
+              <a:spcBef>
+                <a:spcPts val="0"/>
+              </a:spcBef>
+              <a:spcAft>
+                <a:spcPts val="0"/>
+              </a:spcAft>
+              <a:buNone/>
+            </a:pPr>
+            <a:r>
+              <a:rPr lang="en"/>
+              <a:t>Electric vs. Manual Bikes</a:t>
+            </a:r>
+            <a:endParaRPr/>
+          </a:p>
+        </p:txBody>
+      </p:sp>
+    </p:spTree>
+  </p:cSld>
+  <p:clrMapOvr>
+    <a:masterClrMapping/>
+  </p:clrMapOvr>
+</p:sld>
+</file>
+
+<file path=ppt/slides/slide3.xml><?xml version="1.0" encoding="utf-8"?>
+<p:sld xmlns:a="http://schemas.openxmlformats.org/drawingml/2006/main" xmlns:r="http://schemas.openxmlformats.org/officeDocument/2006/relationships" xmlns:mc="http://schemas.openxmlformats.org/markup-compatibility/2006" xmlns:mv="urn:schemas-microsoft-com:mac:vml" xmlns:p="http://schemas.openxmlformats.org/presentationml/2006/main" xmlns:c="http://schemas.openxmlformats.org/drawingml/2006/chart" xmlns:dgm="http://schemas.openxmlformats.org/drawingml/2006/diagram" xmlns:o="urn:schemas-microsoft-com:office:office" xmlns:v="urn:schemas-microsoft-com:vml" xmlns:pvml="urn:schemas-microsoft-com:office:powerpoint" xmlns:com="http://schemas.openxmlformats.org/drawingml/2006/compatibility" xmlns:p14="http://schemas.microsoft.com/office/powerpoint/2010/main" xmlns:p15="http://schemas.microsoft.com/office/powerpoint/2012/main" xmlns:ahyp="http://schemas.microsoft.com/office/drawing/2018/hyperlinkcolor">
+  <p:cSld>
+    <p:spTree>
+      <p:nvGrpSpPr>
+        <p:cNvPr id="64" name="Shape 64"/>
+        <p:cNvGrpSpPr/>
+        <p:nvPr/>
+      </p:nvGrpSpPr>
+      <p:grpSpPr>
+        <a:xfrm>
+          <a:off x="0" y="0"/>
+          <a:ext cx="0" cy="0"/>
+          <a:chOff x="0" y="0"/>
+          <a:chExt cx="0" cy="0"/>
+        </a:xfrm>
+      </p:grpSpPr>
+      <p:sp>
+        <p:nvSpPr>
+          <p:cNvPr id="65" name="Google Shape;65;p15"/>
+          <p:cNvSpPr txBox="1"/>
+          <p:nvPr>
             <p:ph type="title"/>
           </p:nvPr>
         </p:nvSpPr>
@@ -5913,7 +6078,7 @@
       </p:sp>
       <p:sp>
         <p:nvSpPr>
-          <p:cNvPr id="61" name="Google Shape;61;p14"/>
+          <p:cNvPr id="66" name="Google Shape;66;p15"/>
           <p:cNvSpPr txBox="1"/>
           <p:nvPr>
             <p:ph idx="1" type="body"/>
@@ -5958,12 +6123,12 @@
 </p:sld>
 </file>
 
-<file path=ppt/slides/slide3.xml><?xml version="1.0" encoding="utf-8"?>
+<file path=ppt/slides/slide4.xml><?xml version="1.0" encoding="utf-8"?>
 <p:sld xmlns:a="http://schemas.openxmlformats.org/drawingml/2006/main" xmlns:r="http://schemas.openxmlformats.org/officeDocument/2006/relationships" xmlns:mc="http://schemas.openxmlformats.org/markup-compatibility/2006" xmlns:mv="urn:schemas-microsoft-com:mac:vml" xmlns:p="http://schemas.openxmlformats.org/presentationml/2006/main" xmlns:c="http://schemas.openxmlformats.org/drawingml/2006/chart" xmlns:dgm="http://schemas.openxmlformats.org/drawingml/2006/diagram" xmlns:o="urn:schemas-microsoft-com:office:office" xmlns:v="urn:schemas-microsoft-com:vml" xmlns:pvml="urn:schemas-microsoft-com:office:powerpoint" xmlns:com="http://schemas.openxmlformats.org/drawingml/2006/compatibility" xmlns:p14="http://schemas.microsoft.com/office/powerpoint/2010/main" xmlns:p15="http://schemas.microsoft.com/office/powerpoint/2012/main" xmlns:ahyp="http://schemas.microsoft.com/office/drawing/2018/hyperlinkcolor">
   <p:cSld>
     <p:spTree>
       <p:nvGrpSpPr>
-        <p:cNvPr id="65" name="Shape 65"/>
+        <p:cNvPr id="70" name="Shape 70"/>
         <p:cNvGrpSpPr/>
         <p:nvPr/>
       </p:nvGrpSpPr>
@@ -5977,7 +6142,7 @@
       </p:grpSpPr>
       <p:sp>
         <p:nvSpPr>
-          <p:cNvPr id="66" name="Google Shape;66;p15"/>
+          <p:cNvPr id="71" name="Google Shape;71;p16"/>
           <p:cNvSpPr txBox="1"/>
           <p:nvPr>
             <p:ph type="title"/>
@@ -6017,7 +6182,7 @@
       </p:sp>
       <p:sp>
         <p:nvSpPr>
-          <p:cNvPr id="67" name="Google Shape;67;p15"/>
+          <p:cNvPr id="72" name="Google Shape;72;p16"/>
           <p:cNvSpPr txBox="1"/>
           <p:nvPr>
             <p:ph idx="1" type="body"/>
@@ -6105,12 +6270,12 @@
 </p:sld>
 </file>
 
-<file path=ppt/slides/slide4.xml><?xml version="1.0" encoding="utf-8"?>
+<file path=ppt/slides/slide5.xml><?xml version="1.0" encoding="utf-8"?>
 <p:sld xmlns:a="http://schemas.openxmlformats.org/drawingml/2006/main" xmlns:r="http://schemas.openxmlformats.org/officeDocument/2006/relationships" xmlns:mc="http://schemas.openxmlformats.org/markup-compatibility/2006" xmlns:mv="urn:schemas-microsoft-com:mac:vml" xmlns:p="http://schemas.openxmlformats.org/presentationml/2006/main" xmlns:c="http://schemas.openxmlformats.org/drawingml/2006/chart" xmlns:dgm="http://schemas.openxmlformats.org/drawingml/2006/diagram" xmlns:o="urn:schemas-microsoft-com:office:office" xmlns:v="urn:schemas-microsoft-com:vml" xmlns:pvml="urn:schemas-microsoft-com:office:powerpoint" xmlns:com="http://schemas.openxmlformats.org/drawingml/2006/compatibility" xmlns:p14="http://schemas.microsoft.com/office/powerpoint/2010/main" xmlns:p15="http://schemas.microsoft.com/office/powerpoint/2012/main" xmlns:ahyp="http://schemas.microsoft.com/office/drawing/2018/hyperlinkcolor">
   <p:cSld>
     <p:spTree>
       <p:nvGrpSpPr>
-        <p:cNvPr id="71" name="Shape 71"/>
+        <p:cNvPr id="76" name="Shape 76"/>
         <p:cNvGrpSpPr/>
         <p:nvPr/>
       </p:nvGrpSpPr>
@@ -6124,7 +6289,7 @@
       </p:grpSpPr>
       <p:sp>
         <p:nvSpPr>
-          <p:cNvPr id="72" name="Google Shape;72;p16"/>
+          <p:cNvPr id="77" name="Google Shape;77;p17"/>
           <p:cNvSpPr txBox="1"/>
           <p:nvPr>
             <p:ph type="title"/>
@@ -6164,7 +6329,7 @@
       </p:sp>
       <p:sp>
         <p:nvSpPr>
-          <p:cNvPr id="73" name="Google Shape;73;p16"/>
+          <p:cNvPr id="78" name="Google Shape;78;p17"/>
           <p:cNvSpPr txBox="1"/>
           <p:nvPr>
             <p:ph idx="1" type="body"/>
@@ -6213,7 +6378,25 @@
               <a:buChar char="●"/>
             </a:pPr>
             <a:r>
-              <a:t/>
+              <a:rPr lang="en"/>
+              <a:t>Bar Chart</a:t>
+            </a:r>
+            <a:endParaRPr/>
+          </a:p>
+          <a:p>
+            <a:pPr indent="-342900" lvl="0" marL="457200" rtl="0" algn="l">
+              <a:spcBef>
+                <a:spcPts val="0"/>
+              </a:spcBef>
+              <a:spcAft>
+                <a:spcPts val="0"/>
+              </a:spcAft>
+              <a:buSzPts val="1800"/>
+              <a:buChar char="●"/>
+            </a:pPr>
+            <a:r>
+              <a:rPr lang="en"/>
+              <a:t>Heat Mat </a:t>
             </a:r>
             <a:endParaRPr/>
           </a:p>

</xml_diff>

<commit_message>
Uploading final dashboard presentation
</commit_message>
<xml_diff>
--- a/Dashboard Blueprint.pptx
+++ b/Dashboard Blueprint.pptx
@@ -16,6 +16,7 @@
     <p:sldId id="261" r:id="rId11"/>
     <p:sldId id="262" r:id="rId12"/>
     <p:sldId id="263" r:id="rId13"/>
+    <p:sldId id="264" r:id="rId14"/>
   </p:sldIdLst>
   <p:sldSz cy="5143500" cx="9144000"/>
   <p:notesSz cx="6858000" cy="9144000"/>
@@ -896,7 +897,7 @@
   <p:cSld>
     <p:spTree>
       <p:nvGrpSpPr>
-        <p:cNvPr id="61" name="Shape 61"/>
+        <p:cNvPr id="62" name="Shape 62"/>
         <p:cNvGrpSpPr/>
         <p:nvPr/>
       </p:nvGrpSpPr>
@@ -910,7 +911,7 @@
       </p:grpSpPr>
       <p:sp>
         <p:nvSpPr>
-          <p:cNvPr id="62" name="Google Shape;62;g147cb57765a_0_0:notes"/>
+          <p:cNvPr id="63" name="Google Shape;63;g1421e8b540f_0_5:notes"/>
           <p:cNvSpPr/>
           <p:nvPr>
             <p:ph idx="2" type="sldImg"/>
@@ -945,7 +946,7 @@
       </p:sp>
       <p:sp>
         <p:nvSpPr>
-          <p:cNvPr id="63" name="Google Shape;63;g147cb57765a_0_0:notes"/>
+          <p:cNvPr id="64" name="Google Shape;64;g1421e8b540f_0_5:notes"/>
           <p:cNvSpPr txBox="1"/>
           <p:nvPr>
             <p:ph idx="1" type="body"/>
@@ -995,7 +996,7 @@
   <p:cSld>
     <p:spTree>
       <p:nvGrpSpPr>
-        <p:cNvPr id="66" name="Shape 66"/>
+        <p:cNvPr id="68" name="Shape 68"/>
         <p:cNvGrpSpPr/>
         <p:nvPr/>
       </p:nvGrpSpPr>
@@ -1009,7 +1010,7 @@
       </p:grpSpPr>
       <p:sp>
         <p:nvSpPr>
-          <p:cNvPr id="67" name="Google Shape;67;g147cb57765a_0_6:notes"/>
+          <p:cNvPr id="69" name="Google Shape;69;g1421e8b540f_0_18:notes"/>
           <p:cNvSpPr/>
           <p:nvPr>
             <p:ph idx="2" type="sldImg"/>
@@ -1044,7 +1045,7 @@
       </p:sp>
       <p:sp>
         <p:nvSpPr>
-          <p:cNvPr id="68" name="Google Shape;68;g147cb57765a_0_6:notes"/>
+          <p:cNvPr id="70" name="Google Shape;70;g1421e8b540f_0_18:notes"/>
           <p:cNvSpPr txBox="1"/>
           <p:nvPr>
             <p:ph idx="1" type="body"/>
@@ -1094,7 +1095,7 @@
   <p:cSld>
     <p:spTree>
       <p:nvGrpSpPr>
-        <p:cNvPr id="71" name="Shape 71"/>
+        <p:cNvPr id="74" name="Shape 74"/>
         <p:cNvGrpSpPr/>
         <p:nvPr/>
       </p:nvGrpSpPr>
@@ -1108,7 +1109,7 @@
       </p:grpSpPr>
       <p:sp>
         <p:nvSpPr>
-          <p:cNvPr id="72" name="Google Shape;72;g147cb57765a_0_10:notes"/>
+          <p:cNvPr id="75" name="Google Shape;75;g147cb57765a_0_0:notes"/>
           <p:cNvSpPr/>
           <p:nvPr>
             <p:ph idx="2" type="sldImg"/>
@@ -1143,7 +1144,7 @@
       </p:sp>
       <p:sp>
         <p:nvSpPr>
-          <p:cNvPr id="73" name="Google Shape;73;g147cb57765a_0_10:notes"/>
+          <p:cNvPr id="76" name="Google Shape;76;g147cb57765a_0_0:notes"/>
           <p:cNvSpPr txBox="1"/>
           <p:nvPr>
             <p:ph idx="1" type="body"/>
@@ -1193,7 +1194,7 @@
   <p:cSld>
     <p:spTree>
       <p:nvGrpSpPr>
-        <p:cNvPr id="76" name="Shape 76"/>
+        <p:cNvPr id="81" name="Shape 81"/>
         <p:cNvGrpSpPr/>
         <p:nvPr/>
       </p:nvGrpSpPr>
@@ -1207,7 +1208,7 @@
       </p:grpSpPr>
       <p:sp>
         <p:nvSpPr>
-          <p:cNvPr id="77" name="Google Shape;77;g147cb57765a_0_14:notes"/>
+          <p:cNvPr id="82" name="Google Shape;82;g145a3c5e5ec_0_3:notes"/>
           <p:cNvSpPr/>
           <p:nvPr>
             <p:ph idx="2" type="sldImg"/>
@@ -1242,7 +1243,7 @@
       </p:sp>
       <p:sp>
         <p:nvSpPr>
-          <p:cNvPr id="78" name="Google Shape;78;g147cb57765a_0_14:notes"/>
+          <p:cNvPr id="83" name="Google Shape;83;g145a3c5e5ec_0_3:notes"/>
           <p:cNvSpPr txBox="1"/>
           <p:nvPr>
             <p:ph idx="1" type="body"/>
@@ -1292,7 +1293,7 @@
   <p:cSld>
     <p:spTree>
       <p:nvGrpSpPr>
-        <p:cNvPr id="81" name="Shape 81"/>
+        <p:cNvPr id="87" name="Shape 87"/>
         <p:cNvGrpSpPr/>
         <p:nvPr/>
       </p:nvGrpSpPr>
@@ -1306,7 +1307,7 @@
       </p:grpSpPr>
       <p:sp>
         <p:nvSpPr>
-          <p:cNvPr id="82" name="Google Shape;82;g1421e8b540f_0_5:notes"/>
+          <p:cNvPr id="88" name="Google Shape;88;g145a3c5e5ec_0_8:notes"/>
           <p:cNvSpPr/>
           <p:nvPr>
             <p:ph idx="2" type="sldImg"/>
@@ -1341,7 +1342,7 @@
       </p:sp>
       <p:sp>
         <p:nvSpPr>
-          <p:cNvPr id="83" name="Google Shape;83;g1421e8b540f_0_5:notes"/>
+          <p:cNvPr id="89" name="Google Shape;89;g145a3c5e5ec_0_8:notes"/>
           <p:cNvSpPr txBox="1"/>
           <p:nvPr>
             <p:ph idx="1" type="body"/>
@@ -1391,7 +1392,7 @@
   <p:cSld>
     <p:spTree>
       <p:nvGrpSpPr>
-        <p:cNvPr id="87" name="Shape 87"/>
+        <p:cNvPr id="92" name="Shape 92"/>
         <p:cNvGrpSpPr/>
         <p:nvPr/>
       </p:nvGrpSpPr>
@@ -1405,7 +1406,7 @@
       </p:grpSpPr>
       <p:sp>
         <p:nvSpPr>
-          <p:cNvPr id="88" name="Google Shape;88;g1421e8b540f_0_18:notes"/>
+          <p:cNvPr id="93" name="Google Shape;93;g145a3c5e5ec_0_12:notes"/>
           <p:cNvSpPr/>
           <p:nvPr>
             <p:ph idx="2" type="sldImg"/>
@@ -1440,7 +1441,106 @@
       </p:sp>
       <p:sp>
         <p:nvSpPr>
-          <p:cNvPr id="89" name="Google Shape;89;g1421e8b540f_0_18:notes"/>
+          <p:cNvPr id="94" name="Google Shape;94;g145a3c5e5ec_0_12:notes"/>
+          <p:cNvSpPr txBox="1"/>
+          <p:nvPr>
+            <p:ph idx="1" type="body"/>
+          </p:nvPr>
+        </p:nvSpPr>
+        <p:spPr>
+          <a:xfrm>
+            <a:off x="685800" y="4343400"/>
+            <a:ext cx="5486400" cy="4114800"/>
+          </a:xfrm>
+          <a:prstGeom prst="rect">
+            <a:avLst/>
+          </a:prstGeom>
+        </p:spPr>
+        <p:txBody>
+          <a:bodyPr anchorCtr="0" anchor="t" bIns="91425" lIns="91425" spcFirstLastPara="1" rIns="91425" wrap="square" tIns="91425">
+            <a:noAutofit/>
+          </a:bodyPr>
+          <a:lstStyle/>
+          <a:p>
+            <a:pPr indent="0" lvl="0" marL="0" rtl="0" algn="l">
+              <a:spcBef>
+                <a:spcPts val="0"/>
+              </a:spcBef>
+              <a:spcAft>
+                <a:spcPts val="0"/>
+              </a:spcAft>
+              <a:buNone/>
+            </a:pPr>
+            <a:r>
+              <a:t/>
+            </a:r>
+            <a:endParaRPr/>
+          </a:p>
+        </p:txBody>
+      </p:sp>
+    </p:spTree>
+  </p:cSld>
+  <p:clrMapOvr>
+    <a:masterClrMapping/>
+  </p:clrMapOvr>
+</p:notes>
+</file>
+
+<file path=ppt/notesSlides/notesSlide9.xml><?xml version="1.0" encoding="utf-8"?>
+<p:notes xmlns:a="http://schemas.openxmlformats.org/drawingml/2006/main" xmlns:r="http://schemas.openxmlformats.org/officeDocument/2006/relationships" xmlns:mc="http://schemas.openxmlformats.org/markup-compatibility/2006" xmlns:mv="urn:schemas-microsoft-com:mac:vml" xmlns:p="http://schemas.openxmlformats.org/presentationml/2006/main" xmlns:c="http://schemas.openxmlformats.org/drawingml/2006/chart" xmlns:dgm="http://schemas.openxmlformats.org/drawingml/2006/diagram" xmlns:o="urn:schemas-microsoft-com:office:office" xmlns:v="urn:schemas-microsoft-com:vml" xmlns:pvml="urn:schemas-microsoft-com:office:powerpoint" xmlns:com="http://schemas.openxmlformats.org/drawingml/2006/compatibility" xmlns:p14="http://schemas.microsoft.com/office/powerpoint/2010/main" xmlns:p15="http://schemas.microsoft.com/office/powerpoint/2012/main" xmlns:ahyp="http://schemas.microsoft.com/office/drawing/2018/hyperlinkcolor" showMasterPhAnim="0" showMasterSp="0">
+  <p:cSld>
+    <p:spTree>
+      <p:nvGrpSpPr>
+        <p:cNvPr id="97" name="Shape 97"/>
+        <p:cNvGrpSpPr/>
+        <p:nvPr/>
+      </p:nvGrpSpPr>
+      <p:grpSpPr>
+        <a:xfrm>
+          <a:off x="0" y="0"/>
+          <a:ext cx="0" cy="0"/>
+          <a:chOff x="0" y="0"/>
+          <a:chExt cx="0" cy="0"/>
+        </a:xfrm>
+      </p:grpSpPr>
+      <p:sp>
+        <p:nvSpPr>
+          <p:cNvPr id="98" name="Google Shape;98;g145a3c5e5ec_0_16:notes"/>
+          <p:cNvSpPr/>
+          <p:nvPr>
+            <p:ph idx="2" type="sldImg"/>
+          </p:nvPr>
+        </p:nvSpPr>
+        <p:spPr>
+          <a:xfrm>
+            <a:off x="381300" y="685800"/>
+            <a:ext cx="6096000" cy="3429000"/>
+          </a:xfrm>
+          <a:custGeom>
+            <a:rect b="b" l="l" r="r" t="t"/>
+            <a:pathLst>
+              <a:path extrusionOk="0" h="120000" w="120000">
+                <a:moveTo>
+                  <a:pt x="0" y="0"/>
+                </a:moveTo>
+                <a:lnTo>
+                  <a:pt x="120000" y="0"/>
+                </a:lnTo>
+                <a:lnTo>
+                  <a:pt x="120000" y="120000"/>
+                </a:lnTo>
+                <a:lnTo>
+                  <a:pt x="0" y="120000"/>
+                </a:lnTo>
+                <a:close/>
+              </a:path>
+            </a:pathLst>
+          </a:custGeom>
+        </p:spPr>
+      </p:sp>
+      <p:sp>
+        <p:nvSpPr>
+          <p:cNvPr id="99" name="Google Shape;99;g145a3c5e5ec_0_16:notes"/>
           <p:cNvSpPr txBox="1"/>
           <p:nvPr>
             <p:ph idx="1" type="body"/>
@@ -6261,36 +6361,94 @@
           <p:cNvPr id="60" name="Google Shape;60;p14"/>
           <p:cNvSpPr txBox="1"/>
           <p:nvPr>
-            <p:ph type="ctrTitle"/>
+            <p:ph type="title"/>
           </p:nvPr>
         </p:nvSpPr>
         <p:spPr>
           <a:xfrm>
-            <a:off x="311708" y="744575"/>
-            <a:ext cx="8520600" cy="2052600"/>
+            <a:off x="311700" y="445025"/>
+            <a:ext cx="8520600" cy="572700"/>
           </a:xfrm>
           <a:prstGeom prst="rect">
             <a:avLst/>
           </a:prstGeom>
         </p:spPr>
         <p:txBody>
-          <a:bodyPr anchorCtr="0" anchor="b" bIns="91425" lIns="91425" spcFirstLastPara="1" rIns="91425" wrap="square" tIns="91425">
+          <a:bodyPr anchorCtr="0" anchor="t" bIns="91425" lIns="91425" spcFirstLastPara="1" rIns="91425" wrap="square" tIns="91425">
+            <a:normAutofit fontScale="90000"/>
+          </a:bodyPr>
+          <a:lstStyle/>
+          <a:p>
+            <a:pPr indent="0" lvl="0" marL="0" rtl="0" algn="l">
+              <a:spcBef>
+                <a:spcPts val="0"/>
+              </a:spcBef>
+              <a:spcAft>
+                <a:spcPts val="0"/>
+              </a:spcAft>
+              <a:buNone/>
+            </a:pPr>
+            <a:r>
+              <a:rPr lang="en"/>
+              <a:t>Electric vs. Manual Bikes</a:t>
+            </a:r>
+            <a:endParaRPr/>
+          </a:p>
+        </p:txBody>
+      </p:sp>
+      <p:sp>
+        <p:nvSpPr>
+          <p:cNvPr id="61" name="Google Shape;61;p14"/>
+          <p:cNvSpPr txBox="1"/>
+          <p:nvPr>
+            <p:ph idx="1" type="body"/>
+          </p:nvPr>
+        </p:nvSpPr>
+        <p:spPr>
+          <a:xfrm>
+            <a:off x="311700" y="1152475"/>
+            <a:ext cx="8520600" cy="3416400"/>
+          </a:xfrm>
+          <a:prstGeom prst="rect">
+            <a:avLst/>
+          </a:prstGeom>
+        </p:spPr>
+        <p:txBody>
+          <a:bodyPr anchorCtr="0" anchor="t" bIns="91425" lIns="91425" spcFirstLastPara="1" rIns="91425" wrap="square" tIns="91425">
             <a:normAutofit/>
           </a:bodyPr>
           <a:lstStyle/>
           <a:p>
-            <a:pPr indent="0" lvl="0" marL="0" rtl="0" algn="ctr">
-              <a:spcBef>
-                <a:spcPts val="0"/>
-              </a:spcBef>
-              <a:spcAft>
-                <a:spcPts val="0"/>
-              </a:spcAft>
-              <a:buNone/>
+            <a:pPr indent="-342900" lvl="0" marL="457200" rtl="0" algn="l">
+              <a:spcBef>
+                <a:spcPts val="0"/>
+              </a:spcBef>
+              <a:spcAft>
+                <a:spcPts val="0"/>
+              </a:spcAft>
+              <a:buSzPts val="1800"/>
+              <a:buChar char="●"/>
             </a:pPr>
             <a:r>
               <a:rPr lang="en"/>
-              <a:t>Electric vs. Manual Bikes</a:t>
+              <a:t>As a team, we are considering a bike share business. We want to know if electric or manual bikes would be more popular among user. </a:t>
+            </a:r>
+            <a:endParaRPr/>
+          </a:p>
+          <a:p>
+            <a:pPr indent="-342900" lvl="0" marL="457200" rtl="0" algn="l">
+              <a:spcBef>
+                <a:spcPts val="0"/>
+              </a:spcBef>
+              <a:spcAft>
+                <a:spcPts val="0"/>
+              </a:spcAft>
+              <a:buSzPts val="1800"/>
+              <a:buChar char="●"/>
+            </a:pPr>
+            <a:r>
+              <a:rPr lang="en"/>
+              <a:t>To do this we take a sample datasource from CitiBike and perform our analysis.</a:t>
             </a:r>
             <a:endParaRPr/>
           </a:p>
@@ -6309,219 +6467,7 @@
   <p:cSld>
     <p:spTree>
       <p:nvGrpSpPr>
-        <p:cNvPr id="64" name="Shape 64"/>
-        <p:cNvGrpSpPr/>
-        <p:nvPr/>
-      </p:nvGrpSpPr>
-      <p:grpSpPr>
-        <a:xfrm>
-          <a:off x="0" y="0"/>
-          <a:ext cx="0" cy="0"/>
-          <a:chOff x="0" y="0"/>
-          <a:chExt cx="0" cy="0"/>
-        </a:xfrm>
-      </p:grpSpPr>
-      <p:pic>
-        <p:nvPicPr>
-          <p:cNvPr id="65" name="Google Shape;65;p15"/>
-          <p:cNvPicPr preferRelativeResize="0"/>
-          <p:nvPr/>
-        </p:nvPicPr>
-        <p:blipFill>
-          <a:blip r:embed="rId3">
-            <a:alphaModFix/>
-          </a:blip>
-          <a:stretch>
-            <a:fillRect/>
-          </a:stretch>
-        </p:blipFill>
-        <p:spPr>
-          <a:xfrm>
-            <a:off x="174400" y="163375"/>
-            <a:ext cx="6972300" cy="4029075"/>
-          </a:xfrm>
-          <a:prstGeom prst="rect">
-            <a:avLst/>
-          </a:prstGeom>
-          <a:noFill/>
-          <a:ln>
-            <a:noFill/>
-          </a:ln>
-        </p:spPr>
-      </p:pic>
-    </p:spTree>
-  </p:cSld>
-  <p:clrMapOvr>
-    <a:masterClrMapping/>
-  </p:clrMapOvr>
-</p:sld>
-</file>
-
-<file path=ppt/slides/slide4.xml><?xml version="1.0" encoding="utf-8"?>
-<p:sld xmlns:a="http://schemas.openxmlformats.org/drawingml/2006/main" xmlns:r="http://schemas.openxmlformats.org/officeDocument/2006/relationships" xmlns:mc="http://schemas.openxmlformats.org/markup-compatibility/2006" xmlns:mv="urn:schemas-microsoft-com:mac:vml" xmlns:p="http://schemas.openxmlformats.org/presentationml/2006/main" xmlns:c="http://schemas.openxmlformats.org/drawingml/2006/chart" xmlns:dgm="http://schemas.openxmlformats.org/drawingml/2006/diagram" xmlns:o="urn:schemas-microsoft-com:office:office" xmlns:v="urn:schemas-microsoft-com:vml" xmlns:pvml="urn:schemas-microsoft-com:office:powerpoint" xmlns:com="http://schemas.openxmlformats.org/drawingml/2006/compatibility" xmlns:p14="http://schemas.microsoft.com/office/powerpoint/2010/main" xmlns:p15="http://schemas.microsoft.com/office/powerpoint/2012/main" xmlns:ahyp="http://schemas.microsoft.com/office/drawing/2018/hyperlinkcolor">
-  <p:cSld>
-    <p:spTree>
-      <p:nvGrpSpPr>
-        <p:cNvPr id="69" name="Shape 69"/>
-        <p:cNvGrpSpPr/>
-        <p:nvPr/>
-      </p:nvGrpSpPr>
-      <p:grpSpPr>
-        <a:xfrm>
-          <a:off x="0" y="0"/>
-          <a:ext cx="0" cy="0"/>
-          <a:chOff x="0" y="0"/>
-          <a:chExt cx="0" cy="0"/>
-        </a:xfrm>
-      </p:grpSpPr>
-      <p:pic>
-        <p:nvPicPr>
-          <p:cNvPr id="70" name="Google Shape;70;p16"/>
-          <p:cNvPicPr preferRelativeResize="0"/>
-          <p:nvPr/>
-        </p:nvPicPr>
-        <p:blipFill>
-          <a:blip r:embed="rId3">
-            <a:alphaModFix/>
-          </a:blip>
-          <a:stretch>
-            <a:fillRect/>
-          </a:stretch>
-        </p:blipFill>
-        <p:spPr>
-          <a:xfrm>
-            <a:off x="152400" y="152400"/>
-            <a:ext cx="7315200" cy="4486275"/>
-          </a:xfrm>
-          <a:prstGeom prst="rect">
-            <a:avLst/>
-          </a:prstGeom>
-          <a:noFill/>
-          <a:ln>
-            <a:noFill/>
-          </a:ln>
-        </p:spPr>
-      </p:pic>
-    </p:spTree>
-  </p:cSld>
-  <p:clrMapOvr>
-    <a:masterClrMapping/>
-  </p:clrMapOvr>
-</p:sld>
-</file>
-
-<file path=ppt/slides/slide5.xml><?xml version="1.0" encoding="utf-8"?>
-<p:sld xmlns:a="http://schemas.openxmlformats.org/drawingml/2006/main" xmlns:r="http://schemas.openxmlformats.org/officeDocument/2006/relationships" xmlns:mc="http://schemas.openxmlformats.org/markup-compatibility/2006" xmlns:mv="urn:schemas-microsoft-com:mac:vml" xmlns:p="http://schemas.openxmlformats.org/presentationml/2006/main" xmlns:c="http://schemas.openxmlformats.org/drawingml/2006/chart" xmlns:dgm="http://schemas.openxmlformats.org/drawingml/2006/diagram" xmlns:o="urn:schemas-microsoft-com:office:office" xmlns:v="urn:schemas-microsoft-com:vml" xmlns:pvml="urn:schemas-microsoft-com:office:powerpoint" xmlns:com="http://schemas.openxmlformats.org/drawingml/2006/compatibility" xmlns:p14="http://schemas.microsoft.com/office/powerpoint/2010/main" xmlns:p15="http://schemas.microsoft.com/office/powerpoint/2012/main" xmlns:ahyp="http://schemas.microsoft.com/office/drawing/2018/hyperlinkcolor">
-  <p:cSld>
-    <p:spTree>
-      <p:nvGrpSpPr>
-        <p:cNvPr id="74" name="Shape 74"/>
-        <p:cNvGrpSpPr/>
-        <p:nvPr/>
-      </p:nvGrpSpPr>
-      <p:grpSpPr>
-        <a:xfrm>
-          <a:off x="0" y="0"/>
-          <a:ext cx="0" cy="0"/>
-          <a:chOff x="0" y="0"/>
-          <a:chExt cx="0" cy="0"/>
-        </a:xfrm>
-      </p:grpSpPr>
-      <p:pic>
-        <p:nvPicPr>
-          <p:cNvPr id="75" name="Google Shape;75;p17"/>
-          <p:cNvPicPr preferRelativeResize="0"/>
-          <p:nvPr/>
-        </p:nvPicPr>
-        <p:blipFill>
-          <a:blip r:embed="rId3">
-            <a:alphaModFix/>
-          </a:blip>
-          <a:stretch>
-            <a:fillRect/>
-          </a:stretch>
-        </p:blipFill>
-        <p:spPr>
-          <a:xfrm>
-            <a:off x="1251475" y="75475"/>
-            <a:ext cx="5844841" cy="4838699"/>
-          </a:xfrm>
-          <a:prstGeom prst="rect">
-            <a:avLst/>
-          </a:prstGeom>
-          <a:noFill/>
-          <a:ln>
-            <a:noFill/>
-          </a:ln>
-        </p:spPr>
-      </p:pic>
-    </p:spTree>
-  </p:cSld>
-  <p:clrMapOvr>
-    <a:masterClrMapping/>
-  </p:clrMapOvr>
-</p:sld>
-</file>
-
-<file path=ppt/slides/slide6.xml><?xml version="1.0" encoding="utf-8"?>
-<p:sld xmlns:a="http://schemas.openxmlformats.org/drawingml/2006/main" xmlns:r="http://schemas.openxmlformats.org/officeDocument/2006/relationships" xmlns:mc="http://schemas.openxmlformats.org/markup-compatibility/2006" xmlns:mv="urn:schemas-microsoft-com:mac:vml" xmlns:p="http://schemas.openxmlformats.org/presentationml/2006/main" xmlns:c="http://schemas.openxmlformats.org/drawingml/2006/chart" xmlns:dgm="http://schemas.openxmlformats.org/drawingml/2006/diagram" xmlns:o="urn:schemas-microsoft-com:office:office" xmlns:v="urn:schemas-microsoft-com:vml" xmlns:pvml="urn:schemas-microsoft-com:office:powerpoint" xmlns:com="http://schemas.openxmlformats.org/drawingml/2006/compatibility" xmlns:p14="http://schemas.microsoft.com/office/powerpoint/2010/main" xmlns:p15="http://schemas.microsoft.com/office/powerpoint/2012/main" xmlns:ahyp="http://schemas.microsoft.com/office/drawing/2018/hyperlinkcolor">
-  <p:cSld>
-    <p:spTree>
-      <p:nvGrpSpPr>
-        <p:cNvPr id="79" name="Shape 79"/>
-        <p:cNvGrpSpPr/>
-        <p:nvPr/>
-      </p:nvGrpSpPr>
-      <p:grpSpPr>
-        <a:xfrm>
-          <a:off x="0" y="0"/>
-          <a:ext cx="0" cy="0"/>
-          <a:chOff x="0" y="0"/>
-          <a:chExt cx="0" cy="0"/>
-        </a:xfrm>
-      </p:grpSpPr>
-      <p:pic>
-        <p:nvPicPr>
-          <p:cNvPr id="80" name="Google Shape;80;p18"/>
-          <p:cNvPicPr preferRelativeResize="0"/>
-          <p:nvPr/>
-        </p:nvPicPr>
-        <p:blipFill>
-          <a:blip r:embed="rId3">
-            <a:alphaModFix/>
-          </a:blip>
-          <a:stretch>
-            <a:fillRect/>
-          </a:stretch>
-        </p:blipFill>
-        <p:spPr>
-          <a:xfrm>
-            <a:off x="152400" y="152400"/>
-            <a:ext cx="7991071" cy="4838700"/>
-          </a:xfrm>
-          <a:prstGeom prst="rect">
-            <a:avLst/>
-          </a:prstGeom>
-          <a:noFill/>
-          <a:ln>
-            <a:noFill/>
-          </a:ln>
-        </p:spPr>
-      </p:pic>
-    </p:spTree>
-  </p:cSld>
-  <p:clrMapOvr>
-    <a:masterClrMapping/>
-  </p:clrMapOvr>
-</p:sld>
-</file>
-
-<file path=ppt/slides/slide7.xml><?xml version="1.0" encoding="utf-8"?>
-<p:sld xmlns:a="http://schemas.openxmlformats.org/drawingml/2006/main" xmlns:r="http://schemas.openxmlformats.org/officeDocument/2006/relationships" xmlns:mc="http://schemas.openxmlformats.org/markup-compatibility/2006" xmlns:mv="urn:schemas-microsoft-com:mac:vml" xmlns:p="http://schemas.openxmlformats.org/presentationml/2006/main" xmlns:c="http://schemas.openxmlformats.org/drawingml/2006/chart" xmlns:dgm="http://schemas.openxmlformats.org/drawingml/2006/diagram" xmlns:o="urn:schemas-microsoft-com:office:office" xmlns:v="urn:schemas-microsoft-com:vml" xmlns:pvml="urn:schemas-microsoft-com:office:powerpoint" xmlns:com="http://schemas.openxmlformats.org/drawingml/2006/compatibility" xmlns:p14="http://schemas.microsoft.com/office/powerpoint/2010/main" xmlns:p15="http://schemas.microsoft.com/office/powerpoint/2012/main" xmlns:ahyp="http://schemas.microsoft.com/office/drawing/2018/hyperlinkcolor">
-  <p:cSld>
-    <p:spTree>
-      <p:nvGrpSpPr>
-        <p:cNvPr id="84" name="Shape 84"/>
+        <p:cNvPr id="65" name="Shape 65"/>
         <p:cNvGrpSpPr/>
         <p:nvPr/>
       </p:nvGrpSpPr>
@@ -6535,7 +6481,7 @@
       </p:grpSpPr>
       <p:sp>
         <p:nvSpPr>
-          <p:cNvPr id="85" name="Google Shape;85;p19"/>
+          <p:cNvPr id="66" name="Google Shape;66;p15"/>
           <p:cNvSpPr txBox="1"/>
           <p:nvPr>
             <p:ph type="title"/>
@@ -6575,7 +6521,7 @@
       </p:sp>
       <p:sp>
         <p:nvSpPr>
-          <p:cNvPr id="86" name="Google Shape;86;p19"/>
+          <p:cNvPr id="67" name="Google Shape;67;p15"/>
           <p:cNvSpPr txBox="1"/>
           <p:nvPr>
             <p:ph idx="1" type="body"/>
@@ -6663,12 +6609,12 @@
 </p:sld>
 </file>
 
-<file path=ppt/slides/slide8.xml><?xml version="1.0" encoding="utf-8"?>
+<file path=ppt/slides/slide4.xml><?xml version="1.0" encoding="utf-8"?>
 <p:sld xmlns:a="http://schemas.openxmlformats.org/drawingml/2006/main" xmlns:r="http://schemas.openxmlformats.org/officeDocument/2006/relationships" xmlns:mc="http://schemas.openxmlformats.org/markup-compatibility/2006" xmlns:mv="urn:schemas-microsoft-com:mac:vml" xmlns:p="http://schemas.openxmlformats.org/presentationml/2006/main" xmlns:c="http://schemas.openxmlformats.org/drawingml/2006/chart" xmlns:dgm="http://schemas.openxmlformats.org/drawingml/2006/diagram" xmlns:o="urn:schemas-microsoft-com:office:office" xmlns:v="urn:schemas-microsoft-com:vml" xmlns:pvml="urn:schemas-microsoft-com:office:powerpoint" xmlns:com="http://schemas.openxmlformats.org/drawingml/2006/compatibility" xmlns:p14="http://schemas.microsoft.com/office/powerpoint/2010/main" xmlns:p15="http://schemas.microsoft.com/office/powerpoint/2012/main" xmlns:ahyp="http://schemas.microsoft.com/office/drawing/2018/hyperlinkcolor">
   <p:cSld>
     <p:spTree>
       <p:nvGrpSpPr>
-        <p:cNvPr id="90" name="Shape 90"/>
+        <p:cNvPr id="71" name="Shape 71"/>
         <p:cNvGrpSpPr/>
         <p:nvPr/>
       </p:nvGrpSpPr>
@@ -6682,7 +6628,7 @@
       </p:grpSpPr>
       <p:sp>
         <p:nvSpPr>
-          <p:cNvPr id="91" name="Google Shape;91;p20"/>
+          <p:cNvPr id="72" name="Google Shape;72;p16"/>
           <p:cNvSpPr txBox="1"/>
           <p:nvPr>
             <p:ph type="title"/>
@@ -6722,7 +6668,7 @@
       </p:sp>
       <p:sp>
         <p:nvSpPr>
-          <p:cNvPr id="92" name="Google Shape;92;p20"/>
+          <p:cNvPr id="73" name="Google Shape;73;p16"/>
           <p:cNvSpPr txBox="1"/>
           <p:nvPr>
             <p:ph idx="1" type="body"/>
@@ -6776,20 +6722,430 @@
             </a:r>
             <a:endParaRPr/>
           </a:p>
+        </p:txBody>
+      </p:sp>
+    </p:spTree>
+  </p:cSld>
+  <p:clrMapOvr>
+    <a:masterClrMapping/>
+  </p:clrMapOvr>
+</p:sld>
+</file>
+
+<file path=ppt/slides/slide5.xml><?xml version="1.0" encoding="utf-8"?>
+<p:sld xmlns:a="http://schemas.openxmlformats.org/drawingml/2006/main" xmlns:r="http://schemas.openxmlformats.org/officeDocument/2006/relationships" xmlns:mc="http://schemas.openxmlformats.org/markup-compatibility/2006" xmlns:mv="urn:schemas-microsoft-com:mac:vml" xmlns:p="http://schemas.openxmlformats.org/presentationml/2006/main" xmlns:c="http://schemas.openxmlformats.org/drawingml/2006/chart" xmlns:dgm="http://schemas.openxmlformats.org/drawingml/2006/diagram" xmlns:o="urn:schemas-microsoft-com:office:office" xmlns:v="urn:schemas-microsoft-com:vml" xmlns:pvml="urn:schemas-microsoft-com:office:powerpoint" xmlns:com="http://schemas.openxmlformats.org/drawingml/2006/compatibility" xmlns:p14="http://schemas.microsoft.com/office/powerpoint/2010/main" xmlns:p15="http://schemas.microsoft.com/office/powerpoint/2012/main" xmlns:ahyp="http://schemas.microsoft.com/office/drawing/2018/hyperlinkcolor">
+  <p:cSld>
+    <p:spTree>
+      <p:nvGrpSpPr>
+        <p:cNvPr id="77" name="Shape 77"/>
+        <p:cNvGrpSpPr/>
+        <p:nvPr/>
+      </p:nvGrpSpPr>
+      <p:grpSpPr>
+        <a:xfrm>
+          <a:off x="0" y="0"/>
+          <a:ext cx="0" cy="0"/>
+          <a:chOff x="0" y="0"/>
+          <a:chExt cx="0" cy="0"/>
+        </a:xfrm>
+      </p:grpSpPr>
+      <p:pic>
+        <p:nvPicPr>
+          <p:cNvPr id="78" name="Google Shape;78;p17"/>
+          <p:cNvPicPr preferRelativeResize="0"/>
+          <p:nvPr/>
+        </p:nvPicPr>
+        <p:blipFill>
+          <a:blip r:embed="rId3">
+            <a:alphaModFix/>
+          </a:blip>
+          <a:stretch>
+            <a:fillRect/>
+          </a:stretch>
+        </p:blipFill>
+        <p:spPr>
+          <a:xfrm>
+            <a:off x="454575" y="1339350"/>
+            <a:ext cx="5746249" cy="3320575"/>
+          </a:xfrm>
+          <a:prstGeom prst="rect">
+            <a:avLst/>
+          </a:prstGeom>
+          <a:noFill/>
+          <a:ln>
+            <a:noFill/>
+          </a:ln>
+        </p:spPr>
+      </p:pic>
+      <p:sp>
+        <p:nvSpPr>
+          <p:cNvPr id="79" name="Google Shape;79;p17"/>
+          <p:cNvSpPr txBox="1"/>
+          <p:nvPr>
+            <p:ph type="title"/>
+          </p:nvPr>
+        </p:nvSpPr>
+        <p:spPr>
+          <a:xfrm>
+            <a:off x="311700" y="445025"/>
+            <a:ext cx="8520600" cy="572700"/>
+          </a:xfrm>
+          <a:prstGeom prst="rect">
+            <a:avLst/>
+          </a:prstGeom>
+        </p:spPr>
+        <p:txBody>
+          <a:bodyPr anchorCtr="0" anchor="t" bIns="91425" lIns="91425" spcFirstLastPara="1" rIns="91425" wrap="square" tIns="91425">
+            <a:normAutofit fontScale="90000"/>
+          </a:bodyPr>
+          <a:lstStyle/>
           <a:p>
-            <a:pPr indent="-342900" lvl="0" marL="457200" rtl="0" algn="l">
-              <a:spcBef>
-                <a:spcPts val="0"/>
-              </a:spcBef>
-              <a:spcAft>
-                <a:spcPts val="0"/>
-              </a:spcAft>
-              <a:buSzPts val="1800"/>
-              <a:buChar char="●"/>
+            <a:pPr indent="0" lvl="0" marL="0" rtl="0" algn="l">
+              <a:spcBef>
+                <a:spcPts val="0"/>
+              </a:spcBef>
+              <a:spcAft>
+                <a:spcPts val="0"/>
+              </a:spcAft>
+              <a:buNone/>
             </a:pPr>
             <a:r>
               <a:rPr lang="en"/>
-              <a:t>Heat Mat </a:t>
+              <a:t>Images from </a:t>
+            </a:r>
+            <a:r>
+              <a:rPr lang="en"/>
+              <a:t>initial analysis </a:t>
+            </a:r>
+            <a:endParaRPr/>
+          </a:p>
+        </p:txBody>
+      </p:sp>
+      <p:pic>
+        <p:nvPicPr>
+          <p:cNvPr id="80" name="Google Shape;80;p17"/>
+          <p:cNvPicPr preferRelativeResize="0"/>
+          <p:nvPr/>
+        </p:nvPicPr>
+        <p:blipFill rotWithShape="1">
+          <a:blip r:embed="rId4">
+            <a:alphaModFix/>
+          </a:blip>
+          <a:srcRect b="4180" l="0" r="0" t="-4180"/>
+          <a:stretch/>
+        </p:blipFill>
+        <p:spPr>
+          <a:xfrm>
+            <a:off x="3884400" y="1242013"/>
+            <a:ext cx="5157176" cy="3162800"/>
+          </a:xfrm>
+          <a:prstGeom prst="rect">
+            <a:avLst/>
+          </a:prstGeom>
+          <a:noFill/>
+          <a:ln>
+            <a:noFill/>
+          </a:ln>
+        </p:spPr>
+      </p:pic>
+    </p:spTree>
+  </p:cSld>
+  <p:clrMapOvr>
+    <a:masterClrMapping/>
+  </p:clrMapOvr>
+</p:sld>
+</file>
+
+<file path=ppt/slides/slide6.xml><?xml version="1.0" encoding="utf-8"?>
+<p:sld xmlns:a="http://schemas.openxmlformats.org/drawingml/2006/main" xmlns:r="http://schemas.openxmlformats.org/officeDocument/2006/relationships" xmlns:mc="http://schemas.openxmlformats.org/markup-compatibility/2006" xmlns:mv="urn:schemas-microsoft-com:mac:vml" xmlns:p="http://schemas.openxmlformats.org/presentationml/2006/main" xmlns:c="http://schemas.openxmlformats.org/drawingml/2006/chart" xmlns:dgm="http://schemas.openxmlformats.org/drawingml/2006/diagram" xmlns:o="urn:schemas-microsoft-com:office:office" xmlns:v="urn:schemas-microsoft-com:vml" xmlns:pvml="urn:schemas-microsoft-com:office:powerpoint" xmlns:com="http://schemas.openxmlformats.org/drawingml/2006/compatibility" xmlns:p14="http://schemas.microsoft.com/office/powerpoint/2010/main" xmlns:p15="http://schemas.microsoft.com/office/powerpoint/2012/main" xmlns:ahyp="http://schemas.microsoft.com/office/drawing/2018/hyperlinkcolor">
+  <p:cSld>
+    <p:spTree>
+      <p:nvGrpSpPr>
+        <p:cNvPr id="84" name="Shape 84"/>
+        <p:cNvGrpSpPr/>
+        <p:nvPr/>
+      </p:nvGrpSpPr>
+      <p:grpSpPr>
+        <a:xfrm>
+          <a:off x="0" y="0"/>
+          <a:ext cx="0" cy="0"/>
+          <a:chOff x="0" y="0"/>
+          <a:chExt cx="0" cy="0"/>
+        </a:xfrm>
+      </p:grpSpPr>
+      <p:sp>
+        <p:nvSpPr>
+          <p:cNvPr id="85" name="Google Shape;85;p18"/>
+          <p:cNvSpPr txBox="1"/>
+          <p:nvPr>
+            <p:ph type="title"/>
+          </p:nvPr>
+        </p:nvSpPr>
+        <p:spPr>
+          <a:xfrm>
+            <a:off x="311700" y="445025"/>
+            <a:ext cx="8520600" cy="572700"/>
+          </a:xfrm>
+          <a:prstGeom prst="rect">
+            <a:avLst/>
+          </a:prstGeom>
+        </p:spPr>
+        <p:txBody>
+          <a:bodyPr anchorCtr="0" anchor="t" bIns="91425" lIns="91425" spcFirstLastPara="1" rIns="91425" wrap="square" tIns="91425">
+            <a:normAutofit fontScale="90000"/>
+          </a:bodyPr>
+          <a:lstStyle/>
+          <a:p>
+            <a:pPr indent="0" lvl="0" marL="0" rtl="0" algn="l">
+              <a:spcBef>
+                <a:spcPts val="0"/>
+              </a:spcBef>
+              <a:spcAft>
+                <a:spcPts val="0"/>
+              </a:spcAft>
+              <a:buNone/>
+            </a:pPr>
+            <a:r>
+              <a:rPr lang="en"/>
+              <a:t>Data from the Machine Learning Task </a:t>
+            </a:r>
+            <a:endParaRPr/>
+          </a:p>
+        </p:txBody>
+      </p:sp>
+      <p:pic>
+        <p:nvPicPr>
+          <p:cNvPr id="86" name="Google Shape;86;p18"/>
+          <p:cNvPicPr preferRelativeResize="0"/>
+          <p:nvPr/>
+        </p:nvPicPr>
+        <p:blipFill>
+          <a:blip r:embed="rId3">
+            <a:alphaModFix/>
+          </a:blip>
+          <a:stretch>
+            <a:fillRect/>
+          </a:stretch>
+        </p:blipFill>
+        <p:spPr>
+          <a:xfrm>
+            <a:off x="1760425" y="949850"/>
+            <a:ext cx="5256142" cy="3820976"/>
+          </a:xfrm>
+          <a:prstGeom prst="rect">
+            <a:avLst/>
+          </a:prstGeom>
+          <a:noFill/>
+          <a:ln>
+            <a:noFill/>
+          </a:ln>
+        </p:spPr>
+      </p:pic>
+    </p:spTree>
+  </p:cSld>
+  <p:clrMapOvr>
+    <a:masterClrMapping/>
+  </p:clrMapOvr>
+</p:sld>
+</file>
+
+<file path=ppt/slides/slide7.xml><?xml version="1.0" encoding="utf-8"?>
+<p:sld xmlns:a="http://schemas.openxmlformats.org/drawingml/2006/main" xmlns:r="http://schemas.openxmlformats.org/officeDocument/2006/relationships" xmlns:mc="http://schemas.openxmlformats.org/markup-compatibility/2006" xmlns:mv="urn:schemas-microsoft-com:mac:vml" xmlns:p="http://schemas.openxmlformats.org/presentationml/2006/main" xmlns:c="http://schemas.openxmlformats.org/drawingml/2006/chart" xmlns:dgm="http://schemas.openxmlformats.org/drawingml/2006/diagram" xmlns:o="urn:schemas-microsoft-com:office:office" xmlns:v="urn:schemas-microsoft-com:vml" xmlns:pvml="urn:schemas-microsoft-com:office:powerpoint" xmlns:com="http://schemas.openxmlformats.org/drawingml/2006/compatibility" xmlns:p14="http://schemas.microsoft.com/office/powerpoint/2010/main" xmlns:p15="http://schemas.microsoft.com/office/powerpoint/2012/main" xmlns:ahyp="http://schemas.microsoft.com/office/drawing/2018/hyperlinkcolor">
+  <p:cSld>
+    <p:spTree>
+      <p:nvGrpSpPr>
+        <p:cNvPr id="90" name="Shape 90"/>
+        <p:cNvGrpSpPr/>
+        <p:nvPr/>
+      </p:nvGrpSpPr>
+      <p:grpSpPr>
+        <a:xfrm>
+          <a:off x="0" y="0"/>
+          <a:ext cx="0" cy="0"/>
+          <a:chOff x="0" y="0"/>
+          <a:chExt cx="0" cy="0"/>
+        </a:xfrm>
+      </p:grpSpPr>
+      <p:pic>
+        <p:nvPicPr>
+          <p:cNvPr id="91" name="Google Shape;91;p19"/>
+          <p:cNvPicPr preferRelativeResize="0"/>
+          <p:nvPr/>
+        </p:nvPicPr>
+        <p:blipFill rotWithShape="1">
+          <a:blip r:embed="rId3">
+            <a:alphaModFix/>
+          </a:blip>
+          <a:srcRect b="0" l="0" r="0" t="0"/>
+          <a:stretch/>
+        </p:blipFill>
+        <p:spPr>
+          <a:xfrm>
+            <a:off x="945400" y="559900"/>
+            <a:ext cx="6867525" cy="3543300"/>
+          </a:xfrm>
+          <a:prstGeom prst="rect">
+            <a:avLst/>
+          </a:prstGeom>
+          <a:noFill/>
+          <a:ln>
+            <a:noFill/>
+          </a:ln>
+        </p:spPr>
+      </p:pic>
+    </p:spTree>
+  </p:cSld>
+  <p:clrMapOvr>
+    <a:masterClrMapping/>
+  </p:clrMapOvr>
+</p:sld>
+</file>
+
+<file path=ppt/slides/slide8.xml><?xml version="1.0" encoding="utf-8"?>
+<p:sld xmlns:a="http://schemas.openxmlformats.org/drawingml/2006/main" xmlns:r="http://schemas.openxmlformats.org/officeDocument/2006/relationships" xmlns:mc="http://schemas.openxmlformats.org/markup-compatibility/2006" xmlns:mv="urn:schemas-microsoft-com:mac:vml" xmlns:p="http://schemas.openxmlformats.org/presentationml/2006/main" xmlns:c="http://schemas.openxmlformats.org/drawingml/2006/chart" xmlns:dgm="http://schemas.openxmlformats.org/drawingml/2006/diagram" xmlns:o="urn:schemas-microsoft-com:office:office" xmlns:v="urn:schemas-microsoft-com:vml" xmlns:pvml="urn:schemas-microsoft-com:office:powerpoint" xmlns:com="http://schemas.openxmlformats.org/drawingml/2006/compatibility" xmlns:p14="http://schemas.microsoft.com/office/powerpoint/2010/main" xmlns:p15="http://schemas.microsoft.com/office/powerpoint/2012/main" xmlns:ahyp="http://schemas.microsoft.com/office/drawing/2018/hyperlinkcolor">
+  <p:cSld>
+    <p:spTree>
+      <p:nvGrpSpPr>
+        <p:cNvPr id="95" name="Shape 95"/>
+        <p:cNvGrpSpPr/>
+        <p:nvPr/>
+      </p:nvGrpSpPr>
+      <p:grpSpPr>
+        <a:xfrm>
+          <a:off x="0" y="0"/>
+          <a:ext cx="0" cy="0"/>
+          <a:chOff x="0" y="0"/>
+          <a:chExt cx="0" cy="0"/>
+        </a:xfrm>
+      </p:grpSpPr>
+      <p:pic>
+        <p:nvPicPr>
+          <p:cNvPr id="96" name="Google Shape;96;p20"/>
+          <p:cNvPicPr preferRelativeResize="0"/>
+          <p:nvPr/>
+        </p:nvPicPr>
+        <p:blipFill>
+          <a:blip r:embed="rId3">
+            <a:alphaModFix/>
+          </a:blip>
+          <a:stretch>
+            <a:fillRect/>
+          </a:stretch>
+        </p:blipFill>
+        <p:spPr>
+          <a:xfrm>
+            <a:off x="152400" y="152400"/>
+            <a:ext cx="8839200" cy="4562168"/>
+          </a:xfrm>
+          <a:prstGeom prst="rect">
+            <a:avLst/>
+          </a:prstGeom>
+          <a:noFill/>
+          <a:ln>
+            <a:noFill/>
+          </a:ln>
+        </p:spPr>
+      </p:pic>
+    </p:spTree>
+  </p:cSld>
+  <p:clrMapOvr>
+    <a:masterClrMapping/>
+  </p:clrMapOvr>
+</p:sld>
+</file>
+
+<file path=ppt/slides/slide9.xml><?xml version="1.0" encoding="utf-8"?>
+<p:sld xmlns:a="http://schemas.openxmlformats.org/drawingml/2006/main" xmlns:r="http://schemas.openxmlformats.org/officeDocument/2006/relationships" xmlns:mc="http://schemas.openxmlformats.org/markup-compatibility/2006" xmlns:mv="urn:schemas-microsoft-com:mac:vml" xmlns:p="http://schemas.openxmlformats.org/presentationml/2006/main" xmlns:c="http://schemas.openxmlformats.org/drawingml/2006/chart" xmlns:dgm="http://schemas.openxmlformats.org/drawingml/2006/diagram" xmlns:o="urn:schemas-microsoft-com:office:office" xmlns:v="urn:schemas-microsoft-com:vml" xmlns:pvml="urn:schemas-microsoft-com:office:powerpoint" xmlns:com="http://schemas.openxmlformats.org/drawingml/2006/compatibility" xmlns:p14="http://schemas.microsoft.com/office/powerpoint/2010/main" xmlns:p15="http://schemas.microsoft.com/office/powerpoint/2012/main" xmlns:ahyp="http://schemas.microsoft.com/office/drawing/2018/hyperlinkcolor">
+  <p:cSld>
+    <p:spTree>
+      <p:nvGrpSpPr>
+        <p:cNvPr id="100" name="Shape 100"/>
+        <p:cNvGrpSpPr/>
+        <p:nvPr/>
+      </p:nvGrpSpPr>
+      <p:grpSpPr>
+        <a:xfrm>
+          <a:off x="0" y="0"/>
+          <a:ext cx="0" cy="0"/>
+          <a:chOff x="0" y="0"/>
+          <a:chExt cx="0" cy="0"/>
+        </a:xfrm>
+      </p:grpSpPr>
+      <p:sp>
+        <p:nvSpPr>
+          <p:cNvPr id="101" name="Google Shape;101;p21"/>
+          <p:cNvSpPr txBox="1"/>
+          <p:nvPr>
+            <p:ph type="ctrTitle"/>
+          </p:nvPr>
+        </p:nvSpPr>
+        <p:spPr>
+          <a:xfrm>
+            <a:off x="311708" y="744575"/>
+            <a:ext cx="8520600" cy="2052600"/>
+          </a:xfrm>
+          <a:prstGeom prst="rect">
+            <a:avLst/>
+          </a:prstGeom>
+        </p:spPr>
+        <p:txBody>
+          <a:bodyPr anchorCtr="0" anchor="b" bIns="91425" lIns="91425" spcFirstLastPara="1" rIns="91425" wrap="square" tIns="91425">
+            <a:normAutofit/>
+          </a:bodyPr>
+          <a:lstStyle/>
+          <a:p>
+            <a:pPr indent="0" lvl="0" marL="0" rtl="0" algn="ctr">
+              <a:spcBef>
+                <a:spcPts val="0"/>
+              </a:spcBef>
+              <a:spcAft>
+                <a:spcPts val="0"/>
+              </a:spcAft>
+              <a:buNone/>
+            </a:pPr>
+            <a:r>
+              <a:rPr lang="en"/>
+              <a:t>Interactive Element</a:t>
+            </a:r>
+            <a:endParaRPr/>
+          </a:p>
+        </p:txBody>
+      </p:sp>
+      <p:sp>
+        <p:nvSpPr>
+          <p:cNvPr id="102" name="Google Shape;102;p21"/>
+          <p:cNvSpPr txBox="1"/>
+          <p:nvPr>
+            <p:ph idx="1" type="subTitle"/>
+          </p:nvPr>
+        </p:nvSpPr>
+        <p:spPr>
+          <a:xfrm>
+            <a:off x="311700" y="2834125"/>
+            <a:ext cx="8520600" cy="792600"/>
+          </a:xfrm>
+          <a:prstGeom prst="rect">
+            <a:avLst/>
+          </a:prstGeom>
+        </p:spPr>
+        <p:txBody>
+          <a:bodyPr anchorCtr="0" anchor="t" bIns="91425" lIns="91425" spcFirstLastPara="1" rIns="91425" wrap="square" tIns="91425">
+            <a:normAutofit/>
+          </a:bodyPr>
+          <a:lstStyle/>
+          <a:p>
+            <a:pPr indent="0" lvl="0" marL="0" rtl="0" algn="ctr">
+              <a:spcBef>
+                <a:spcPts val="0"/>
+              </a:spcBef>
+              <a:spcAft>
+                <a:spcPts val="0"/>
+              </a:spcAft>
+              <a:buNone/>
+            </a:pPr>
+            <a:r>
+              <a:rPr lang="en"/>
+              <a:t>[Paige’s tableau link]</a:t>
             </a:r>
             <a:endParaRPr/>
           </a:p>

</xml_diff>